<commit_message>
Added syllabus for S22
</commit_message>
<xml_diff>
--- a/lectures/CourseAdmin.pptx
+++ b/lectures/CourseAdmin.pptx
@@ -222,7 +222,7 @@
           <a:p>
             <a:fld id="{B7D6DDD3-D7E9-488B-B626-1E8285E424D8}" type="datetimeFigureOut">
               <a:rPr lang="en-US" smtClean="0"/>
-              <a:t>9/9/21</a:t>
+              <a:t>1/12/22</a:t>
             </a:fld>
             <a:endParaRPr lang="en-US"/>
           </a:p>
@@ -4031,15 +4031,7 @@
           <a:p>
             <a:r>
               <a:rPr lang="en-US" dirty="0"/>
-              <a:t>EL-GY 6143/</a:t>
-            </a:r>
-            <a:r>
-              <a:rPr lang="en-US"/>
-              <a:t>CS-GY 6923: Introduction </a:t>
-            </a:r>
-            <a:r>
-              <a:rPr lang="en-US" dirty="0"/>
-              <a:t>to machine learning</a:t>
+              <a:t>EL-GY 6143/CS-GY 6923: Introduction to machine learning</a:t>
             </a:r>
           </a:p>
           <a:p>
@@ -5582,17 +5574,13 @@
             </a:r>
             <a:r>
               <a:rPr lang="en-US" dirty="0"/>
-              <a:t> Floor (Only available on Zoom during Fall 2021)</a:t>
-            </a:r>
-          </a:p>
-          <a:p>
-            <a:pPr lvl="1"/>
-            <a:endParaRPr lang="en-US" dirty="0"/>
+              <a:t> Floor</a:t>
+            </a:r>
           </a:p>
           <a:p>
             <a:r>
               <a:rPr lang="de-DE" dirty="0"/>
-              <a:t>Head TA:  </a:t>
+              <a:t>Lead TA:  </a:t>
             </a:r>
           </a:p>
           <a:p>
@@ -5639,11 +5627,19 @@
             </a:r>
             <a:r>
               <a:rPr lang="de-DE" dirty="0"/>
+              <a:t>, </a:t>
+            </a:r>
+            <a:r>
+              <a:rPr lang="de-DE" dirty="0" err="1"/>
+              <a:t>and</a:t>
+            </a:r>
+            <a:r>
+              <a:rPr lang="de-DE" dirty="0"/>
               <a:t> </a:t>
             </a:r>
             <a:r>
               <a:rPr lang="de-DE" dirty="0" err="1"/>
-              <a:t>regarding</a:t>
+              <a:t>re-grading</a:t>
             </a:r>
             <a:r>
               <a:rPr lang="de-DE" dirty="0"/>

</xml_diff>

<commit_message>
Updated syllabus of F22
</commit_message>
<xml_diff>
--- a/lectures/CourseAdmin.pptx
+++ b/lectures/CourseAdmin.pptx
@@ -222,7 +222,7 @@
           <a:p>
             <a:fld id="{B7D6DDD3-D7E9-488B-B626-1E8285E424D8}" type="datetimeFigureOut">
               <a:rPr lang="en-US" smtClean="0"/>
-              <a:t>1/25/22</a:t>
+              <a:t>8/15/22</a:t>
             </a:fld>
             <a:endParaRPr lang="en-US"/>
           </a:p>
@@ -5587,15 +5587,7 @@
             <a:pPr lvl="1"/>
             <a:r>
               <a:rPr lang="en-US" dirty="0"/>
-              <a:t>Mustafa </a:t>
-            </a:r>
-            <a:r>
-              <a:rPr lang="en-US" dirty="0" err="1"/>
-              <a:t>Ozkoc</a:t>
-            </a:r>
-            <a:r>
-              <a:rPr lang="en-US" dirty="0"/>
-              <a:t>,</a:t>
+              <a:t>Ashutosh Srivastava,</a:t>
             </a:r>
             <a:r>
               <a:rPr lang="zh-CN" altLang="en-US" dirty="0"/>
@@ -5603,7 +5595,7 @@
             </a:r>
             <a:r>
               <a:rPr lang="en-US" altLang="zh-CN" dirty="0"/>
-              <a:t>mfo254@nyu.edu</a:t>
+              <a:t>as12738@nyu.edu</a:t>
             </a:r>
             <a:endParaRPr lang="en-US" dirty="0"/>
           </a:p>
@@ -5842,7 +5834,7 @@
               <a:t> </a:t>
             </a:r>
             <a:r>
-              <a:rPr lang="de-DE"/>
+              <a:rPr lang="de-DE" dirty="0" err="1"/>
               <a:t>hours</a:t>
             </a:r>
             <a:endParaRPr lang="de-DE" dirty="0"/>

</xml_diff>